<commit_message>
Added Fixes to Slides
</commit_message>
<xml_diff>
--- a/Presentation/01_Introduction.pptx
+++ b/Presentation/01_Introduction.pptx
@@ -211,6 +211,9 @@
         </p14:section>
       </p14:sectionLst>
     </p:ext>
+    <p:ext uri="{EFAFB233-063F-42B5-8137-9DF3F51BA10A}">
+      <p15:sldGuideLst xmlns:p15="http://schemas.microsoft.com/office/powerpoint/2012/main"/>
+    </p:ext>
   </p:extLst>
 </p:presentation>
 </file>
@@ -297,7 +300,7 @@
           <a:p>
             <a:fld id="{C4700912-4235-4919-8FA2-65311B9E870B}" type="datetimeFigureOut">
               <a:rPr lang="en-US" smtClean="0"/>
-              <a:t>9/14/2015</a:t>
+              <a:t>9/15/2015</a:t>
             </a:fld>
             <a:endParaRPr lang="en-US"/>
           </a:p>
@@ -1050,7 +1053,7 @@
           <a:p>
             <a:fld id="{C2DF68C7-1028-4A57-A729-4297D2B5DE39}" type="datetimeFigureOut">
               <a:rPr lang="en-US" smtClean="0"/>
-              <a:t>9/14/2015</a:t>
+              <a:t>9/15/2015</a:t>
             </a:fld>
             <a:endParaRPr lang="en-US"/>
           </a:p>
@@ -1227,7 +1230,7 @@
           <a:p>
             <a:fld id="{C2DF68C7-1028-4A57-A729-4297D2B5DE39}" type="datetimeFigureOut">
               <a:rPr lang="en-US" smtClean="0"/>
-              <a:t>9/14/2015</a:t>
+              <a:t>9/15/2015</a:t>
             </a:fld>
             <a:endParaRPr lang="en-US"/>
           </a:p>
@@ -1414,7 +1417,7 @@
           <a:p>
             <a:fld id="{C2DF68C7-1028-4A57-A729-4297D2B5DE39}" type="datetimeFigureOut">
               <a:rPr lang="en-US" smtClean="0"/>
-              <a:t>9/14/2015</a:t>
+              <a:t>9/15/2015</a:t>
             </a:fld>
             <a:endParaRPr lang="en-US"/>
           </a:p>
@@ -1565,7 +1568,7 @@
           <a:p>
             <a:fld id="{C2DF68C7-1028-4A57-A729-4297D2B5DE39}" type="datetimeFigureOut">
               <a:rPr lang="en-US" smtClean="0"/>
-              <a:t>9/14/2015</a:t>
+              <a:t>9/15/2015</a:t>
             </a:fld>
             <a:endParaRPr lang="en-US"/>
           </a:p>
@@ -1692,7 +1695,7 @@
           <a:p>
             <a:fld id="{C2DF68C7-1028-4A57-A729-4297D2B5DE39}" type="datetimeFigureOut">
               <a:rPr lang="en-US" smtClean="0"/>
-              <a:t>9/14/2015</a:t>
+              <a:t>9/15/2015</a:t>
             </a:fld>
             <a:endParaRPr lang="en-US"/>
           </a:p>
@@ -1862,7 +1865,7 @@
           <a:p>
             <a:fld id="{C2DF68C7-1028-4A57-A729-4297D2B5DE39}" type="datetimeFigureOut">
               <a:rPr lang="en-US" smtClean="0"/>
-              <a:t>9/14/2015</a:t>
+              <a:t>9/15/2015</a:t>
             </a:fld>
             <a:endParaRPr lang="en-US"/>
           </a:p>
@@ -2115,7 +2118,7 @@
           <a:p>
             <a:fld id="{C2DF68C7-1028-4A57-A729-4297D2B5DE39}" type="datetimeFigureOut">
               <a:rPr lang="en-US" smtClean="0"/>
-              <a:t>9/14/2015</a:t>
+              <a:t>9/15/2015</a:t>
             </a:fld>
             <a:endParaRPr lang="en-US"/>
           </a:p>
@@ -2354,7 +2357,7 @@
           <a:p>
             <a:fld id="{C2DF68C7-1028-4A57-A729-4297D2B5DE39}" type="datetimeFigureOut">
               <a:rPr lang="en-US" smtClean="0"/>
-              <a:t>9/14/2015</a:t>
+              <a:t>9/15/2015</a:t>
             </a:fld>
             <a:endParaRPr lang="en-US"/>
           </a:p>
@@ -2728,7 +2731,7 @@
           <a:p>
             <a:fld id="{C2DF68C7-1028-4A57-A729-4297D2B5DE39}" type="datetimeFigureOut">
               <a:rPr lang="en-US" smtClean="0"/>
-              <a:t>9/14/2015</a:t>
+              <a:t>9/15/2015</a:t>
             </a:fld>
             <a:endParaRPr lang="en-US"/>
           </a:p>
@@ -2853,7 +2856,7 @@
           <a:p>
             <a:fld id="{C2DF68C7-1028-4A57-A729-4297D2B5DE39}" type="datetimeFigureOut">
               <a:rPr lang="en-US" smtClean="0"/>
-              <a:t>9/14/2015</a:t>
+              <a:t>9/15/2015</a:t>
             </a:fld>
             <a:endParaRPr lang="en-US"/>
           </a:p>
@@ -2955,7 +2958,7 @@
           <a:p>
             <a:fld id="{C2DF68C7-1028-4A57-A729-4297D2B5DE39}" type="datetimeFigureOut">
               <a:rPr lang="en-US" smtClean="0"/>
-              <a:t>9/14/2015</a:t>
+              <a:t>9/15/2015</a:t>
             </a:fld>
             <a:endParaRPr lang="en-US"/>
           </a:p>
@@ -3239,7 +3242,7 @@
           <a:p>
             <a:fld id="{C2DF68C7-1028-4A57-A729-4297D2B5DE39}" type="datetimeFigureOut">
               <a:rPr lang="en-US" smtClean="0"/>
-              <a:t>9/14/2015</a:t>
+              <a:t>9/15/2015</a:t>
             </a:fld>
             <a:endParaRPr lang="en-US"/>
           </a:p>
@@ -3496,7 +3499,7 @@
           <a:p>
             <a:fld id="{C2DF68C7-1028-4A57-A729-4297D2B5DE39}" type="datetimeFigureOut">
               <a:rPr lang="en-US" smtClean="0"/>
-              <a:t>9/14/2015</a:t>
+              <a:t>9/15/2015</a:t>
             </a:fld>
             <a:endParaRPr lang="en-US"/>
           </a:p>
@@ -3709,7 +3712,7 @@
           <a:p>
             <a:fld id="{C2DF68C7-1028-4A57-A729-4297D2B5DE39}" type="datetimeFigureOut">
               <a:rPr lang="en-US" smtClean="0"/>
-              <a:t>9/14/2015</a:t>
+              <a:t>9/15/2015</a:t>
             </a:fld>
             <a:endParaRPr lang="en-US"/>
           </a:p>
@@ -5548,11 +5551,11 @@
   <p:clrMapOvr>
     <a:masterClrMapping/>
   </p:clrMapOvr>
-  <mc:AlternateContent xmlns:mc="http://schemas.openxmlformats.org/markup-compatibility/2006">
-    <mc:Choice xmlns:p14="http://schemas.microsoft.com/office/powerpoint/2010/main" Requires="p14">
+  <mc:AlternateContent xmlns:mc="http://schemas.openxmlformats.org/markup-compatibility/2006" xmlns:p14="http://schemas.microsoft.com/office/powerpoint/2010/main">
+    <mc:Choice Requires="p14">
       <p:transition spd="slow" p14:dur="2000"/>
     </mc:Choice>
-    <mc:Fallback>
+    <mc:Fallback xmlns="">
       <p:transition spd="slow"/>
     </mc:Fallback>
   </mc:AlternateContent>
@@ -6652,11 +6655,11 @@
   <p:clrMapOvr>
     <a:masterClrMapping/>
   </p:clrMapOvr>
-  <mc:AlternateContent xmlns:mc="http://schemas.openxmlformats.org/markup-compatibility/2006">
-    <mc:Choice xmlns:p14="http://schemas.microsoft.com/office/powerpoint/2010/main" Requires="p14">
+  <mc:AlternateContent xmlns:mc="http://schemas.openxmlformats.org/markup-compatibility/2006" xmlns:p14="http://schemas.microsoft.com/office/powerpoint/2010/main">
+    <mc:Choice Requires="p14">
       <p:transition spd="slow" p14:dur="2000"/>
     </mc:Choice>
-    <mc:Fallback>
+    <mc:Fallback xmlns="">
       <p:transition spd="slow"/>
     </mc:Fallback>
   </mc:AlternateContent>
@@ -6772,11 +6775,11 @@
   <p:clrMapOvr>
     <a:masterClrMapping/>
   </p:clrMapOvr>
-  <mc:AlternateContent xmlns:mc="http://schemas.openxmlformats.org/markup-compatibility/2006">
-    <mc:Choice xmlns:p14="http://schemas.microsoft.com/office/powerpoint/2010/main" Requires="p14">
+  <mc:AlternateContent xmlns:mc="http://schemas.openxmlformats.org/markup-compatibility/2006" xmlns:p14="http://schemas.microsoft.com/office/powerpoint/2010/main">
+    <mc:Choice Requires="p14">
       <p:transition spd="slow" p14:dur="2000"/>
     </mc:Choice>
-    <mc:Fallback>
+    <mc:Fallback xmlns="">
       <p:transition spd="slow"/>
     </mc:Fallback>
   </mc:AlternateContent>
@@ -7886,11 +7889,11 @@
   <p:clrMapOvr>
     <a:masterClrMapping/>
   </p:clrMapOvr>
-  <mc:AlternateContent xmlns:mc="http://schemas.openxmlformats.org/markup-compatibility/2006">
-    <mc:Choice xmlns:p14="http://schemas.microsoft.com/office/powerpoint/2010/main" Requires="p14">
+  <mc:AlternateContent xmlns:mc="http://schemas.openxmlformats.org/markup-compatibility/2006" xmlns:p14="http://schemas.microsoft.com/office/powerpoint/2010/main">
+    <mc:Choice Requires="p14">
       <p:transition spd="slow" p14:dur="2000"/>
     </mc:Choice>
-    <mc:Fallback>
+    <mc:Fallback xmlns="">
       <p:transition spd="slow"/>
     </mc:Fallback>
   </mc:AlternateContent>
@@ -8022,7 +8025,7 @@
             <p:ph sz="quarter" idx="10"/>
             <p:extLst>
               <p:ext uri="{D42A27DB-BD31-4B8C-83A1-F6EECF244321}">
-                <p14:modId xmlns:p14="http://schemas.microsoft.com/office/powerpoint/2010/main" val="2126474530"/>
+                <p14:modId xmlns:p14="http://schemas.microsoft.com/office/powerpoint/2010/main" val="2158223090"/>
               </p:ext>
             </p:extLst>
           </p:nvPr>
@@ -8041,14 +8044,14 @@
                 <a:gridCol w="5762625">
                   <a:extLst>
                     <a:ext uri="{9D8B030D-6E8A-4147-A177-3AD203B41FA5}">
-                      <a16:colId xmlns:a16="http://schemas.microsoft.com/office/drawing/2014/main" xmlns="" val="1632794655"/>
+                      <a16:colId xmlns:a16="http://schemas.microsoft.com/office/drawing/2014/main" val="1632794655"/>
                     </a:ext>
                   </a:extLst>
                 </a:gridCol>
                 <a:gridCol w="5762625">
                   <a:extLst>
                     <a:ext uri="{9D8B030D-6E8A-4147-A177-3AD203B41FA5}">
-                      <a16:colId xmlns:a16="http://schemas.microsoft.com/office/drawing/2014/main" xmlns="" val="2011313899"/>
+                      <a16:colId xmlns:a16="http://schemas.microsoft.com/office/drawing/2014/main" val="2011313899"/>
                     </a:ext>
                   </a:extLst>
                 </a:gridCol>
@@ -8060,8 +8063,8 @@
                     <a:lstStyle/>
                     <a:p>
                       <a:r>
-                        <a:rPr lang="en-US" sz="3600" dirty="0" smtClean="0"/>
-                        <a:t>Using Node.js with Visual Studio Code</a:t>
+                        <a:rPr lang="en-US" sz="3600" b="1" dirty="0" smtClean="0"/>
+                        <a:t>Building Web Apps with Node.JS for Web Designers</a:t>
                       </a:r>
                       <a:endParaRPr lang="en-US" sz="3600" dirty="0">
                         <a:latin typeface="Segoe UI Light" panose="020B0502040204020203" pitchFamily="34" charset="0"/>
@@ -8083,7 +8086,7 @@
                 </a:tc>
                 <a:extLst>
                   <a:ext uri="{0D108BD9-81ED-4DB2-BD59-A6C34878D82A}">
-                    <a16:rowId xmlns:a16="http://schemas.microsoft.com/office/drawing/2014/main" xmlns="" val="1789177411"/>
+                    <a16:rowId xmlns:a16="http://schemas.microsoft.com/office/drawing/2014/main" val="1789177411"/>
                   </a:ext>
                 </a:extLst>
               </a:tr>
@@ -8145,7 +8148,7 @@
                 </a:tc>
                 <a:extLst>
                   <a:ext uri="{0D108BD9-81ED-4DB2-BD59-A6C34878D82A}">
-                    <a16:rowId xmlns:a16="http://schemas.microsoft.com/office/drawing/2014/main" xmlns="" val="3842815335"/>
+                    <a16:rowId xmlns:a16="http://schemas.microsoft.com/office/drawing/2014/main" val="3842815335"/>
                   </a:ext>
                 </a:extLst>
               </a:tr>
@@ -8193,14 +8196,6 @@
                         <a:tabLst/>
                         <a:defRPr/>
                       </a:pPr>
-                      <a:r>
-                        <a:rPr lang="en-US" sz="2400" dirty="0" smtClean="0"/>
-                        <a:t>05</a:t>
-                      </a:r>
-                      <a:r>
-                        <a:rPr lang="en-US" sz="2400" baseline="0" dirty="0" smtClean="0"/>
-                        <a:t> | Debugging &amp; Deploying Node.JS</a:t>
-                      </a:r>
                       <a:endParaRPr lang="en-US" sz="2400" dirty="0" smtClean="0">
                         <a:latin typeface="Segoe UI Light" panose="020B0502040204020203" pitchFamily="34" charset="0"/>
                         <a:cs typeface="Segoe UI Light" panose="020B0502040204020203" pitchFamily="34" charset="0"/>
@@ -8211,7 +8206,7 @@
                 </a:tc>
                 <a:extLst>
                   <a:ext uri="{0D108BD9-81ED-4DB2-BD59-A6C34878D82A}">
-                    <a16:rowId xmlns:a16="http://schemas.microsoft.com/office/drawing/2014/main" xmlns="" val="321066646"/>
+                    <a16:rowId xmlns:a16="http://schemas.microsoft.com/office/drawing/2014/main" val="321066646"/>
                   </a:ext>
                 </a:extLst>
               </a:tr>
@@ -8286,7 +8281,7 @@
                 </a:tc>
                 <a:extLst>
                   <a:ext uri="{0D108BD9-81ED-4DB2-BD59-A6C34878D82A}">
-                    <a16:rowId xmlns:a16="http://schemas.microsoft.com/office/drawing/2014/main" xmlns="" val="3812060533"/>
+                    <a16:rowId xmlns:a16="http://schemas.microsoft.com/office/drawing/2014/main" val="3812060533"/>
                   </a:ext>
                 </a:extLst>
               </a:tr>
@@ -8304,11 +8299,11 @@
   <p:clrMapOvr>
     <a:masterClrMapping/>
   </p:clrMapOvr>
-  <mc:AlternateContent xmlns:mc="http://schemas.openxmlformats.org/markup-compatibility/2006">
-    <mc:Choice xmlns:p14="http://schemas.microsoft.com/office/powerpoint/2010/main" Requires="p14">
+  <mc:AlternateContent xmlns:mc="http://schemas.openxmlformats.org/markup-compatibility/2006" xmlns:p14="http://schemas.microsoft.com/office/powerpoint/2010/main">
+    <mc:Choice Requires="p14">
       <p:transition spd="slow" p14:dur="2000"/>
     </mc:Choice>
-    <mc:Fallback>
+    <mc:Fallback xmlns="">
       <p:transition spd="slow"/>
     </mc:Fallback>
   </mc:AlternateContent>
@@ -11268,11 +11263,7 @@
           <a:p>
             <a:r>
               <a:rPr lang="en-US" dirty="0" smtClean="0"/>
-              <a:t>Target </a:t>
-            </a:r>
-            <a:r>
-              <a:rPr lang="en-US" dirty="0" smtClean="0"/>
-              <a:t>Audience</a:t>
+              <a:t>Target Audience</a:t>
             </a:r>
             <a:endParaRPr lang="en-US" dirty="0"/>
           </a:p>
@@ -11286,7 +11277,6 @@
               <a:rPr lang="en-US" dirty="0" smtClean="0"/>
               <a:t>Designers</a:t>
             </a:r>
-            <a:endParaRPr lang="en-US" dirty="0" smtClean="0"/>
           </a:p>
           <a:p>
             <a:pPr lvl="1"/>
@@ -11299,19 +11289,7 @@
             <a:pPr lvl="1"/>
             <a:r>
               <a:rPr lang="en-US" dirty="0" smtClean="0"/>
-              <a:t>Developers </a:t>
-            </a:r>
-            <a:r>
-              <a:rPr lang="en-US" dirty="0" smtClean="0"/>
-              <a:t>with experience using other </a:t>
-            </a:r>
-            <a:r>
-              <a:rPr lang="en-US" dirty="0" smtClean="0"/>
-              <a:t>server </a:t>
-            </a:r>
-            <a:r>
-              <a:rPr lang="en-US" dirty="0" smtClean="0"/>
-              <a:t>side languages such as PHP, ASP.NET, Python, Ruby etc. </a:t>
+              <a:t>Developers with experience using other server side languages such as PHP, ASP.NET, Python, Ruby etc. </a:t>
             </a:r>
           </a:p>
           <a:p>

</xml_diff>